<commit_message>
re #712: Made TransducerToProbe transformation computation more clear (committed missed changes)
git-svn-id: https://subversion.assembla.com/svn/plus/trunk/doc@3401 c04e96f8-ac36-4ff2-8b34-4a5e34ef045f
</commit_message>
<xml_diff>
--- a/tutorials/TransducerToProbeTransformComputation.pptx
+++ b/tutorials/TransducerToProbeTransformComputation.pptx
@@ -109,6 +109,22 @@
       </a:defRPr>
     </a:lvl9pPr>
   </p:defaultTextStyle>
+  <p:extLst>
+    <p:ext uri="{EFAFB233-063F-42B5-8137-9DF3F51BA10A}">
+      <p15:sldGuideLst xmlns:p15="http://schemas.microsoft.com/office/powerpoint/2012/main">
+        <p15:guide id="1" orient="horz" pos="2160">
+          <p15:clr>
+            <a:srgbClr val="A4A3A4"/>
+          </p15:clr>
+        </p15:guide>
+        <p15:guide id="2" pos="2880">
+          <p15:clr>
+            <a:srgbClr val="A4A3A4"/>
+          </p15:clr>
+        </p15:guide>
+      </p15:sldGuideLst>
+    </p:ext>
+  </p:extLst>
 </p:presentation>
 </file>
 
@@ -293,7 +309,7 @@
           <a:p>
             <a:fld id="{665FFB82-DC97-4841-8F14-AC63817511EF}" type="datetimeFigureOut">
               <a:rPr lang="en-US" smtClean="0"/>
-              <a:t>7/29/2013</a:t>
+              <a:t>6/10/2014</a:t>
             </a:fld>
             <a:endParaRPr lang="en-US"/>
           </a:p>
@@ -463,7 +479,7 @@
           <a:p>
             <a:fld id="{665FFB82-DC97-4841-8F14-AC63817511EF}" type="datetimeFigureOut">
               <a:rPr lang="en-US" smtClean="0"/>
-              <a:t>7/29/2013</a:t>
+              <a:t>6/10/2014</a:t>
             </a:fld>
             <a:endParaRPr lang="en-US"/>
           </a:p>
@@ -643,7 +659,7 @@
           <a:p>
             <a:fld id="{665FFB82-DC97-4841-8F14-AC63817511EF}" type="datetimeFigureOut">
               <a:rPr lang="en-US" smtClean="0"/>
-              <a:t>7/29/2013</a:t>
+              <a:t>6/10/2014</a:t>
             </a:fld>
             <a:endParaRPr lang="en-US"/>
           </a:p>
@@ -813,7 +829,7 @@
           <a:p>
             <a:fld id="{665FFB82-DC97-4841-8F14-AC63817511EF}" type="datetimeFigureOut">
               <a:rPr lang="en-US" smtClean="0"/>
-              <a:t>7/29/2013</a:t>
+              <a:t>6/10/2014</a:t>
             </a:fld>
             <a:endParaRPr lang="en-US"/>
           </a:p>
@@ -1059,7 +1075,7 @@
           <a:p>
             <a:fld id="{665FFB82-DC97-4841-8F14-AC63817511EF}" type="datetimeFigureOut">
               <a:rPr lang="en-US" smtClean="0"/>
-              <a:t>7/29/2013</a:t>
+              <a:t>6/10/2014</a:t>
             </a:fld>
             <a:endParaRPr lang="en-US"/>
           </a:p>
@@ -1347,7 +1363,7 @@
           <a:p>
             <a:fld id="{665FFB82-DC97-4841-8F14-AC63817511EF}" type="datetimeFigureOut">
               <a:rPr lang="en-US" smtClean="0"/>
-              <a:t>7/29/2013</a:t>
+              <a:t>6/10/2014</a:t>
             </a:fld>
             <a:endParaRPr lang="en-US"/>
           </a:p>
@@ -1769,7 +1785,7 @@
           <a:p>
             <a:fld id="{665FFB82-DC97-4841-8F14-AC63817511EF}" type="datetimeFigureOut">
               <a:rPr lang="en-US" smtClean="0"/>
-              <a:t>7/29/2013</a:t>
+              <a:t>6/10/2014</a:t>
             </a:fld>
             <a:endParaRPr lang="en-US"/>
           </a:p>
@@ -1887,7 +1903,7 @@
           <a:p>
             <a:fld id="{665FFB82-DC97-4841-8F14-AC63817511EF}" type="datetimeFigureOut">
               <a:rPr lang="en-US" smtClean="0"/>
-              <a:t>7/29/2013</a:t>
+              <a:t>6/10/2014</a:t>
             </a:fld>
             <a:endParaRPr lang="en-US"/>
           </a:p>
@@ -1982,7 +1998,7 @@
           <a:p>
             <a:fld id="{665FFB82-DC97-4841-8F14-AC63817511EF}" type="datetimeFigureOut">
               <a:rPr lang="en-US" smtClean="0"/>
-              <a:t>7/29/2013</a:t>
+              <a:t>6/10/2014</a:t>
             </a:fld>
             <a:endParaRPr lang="en-US"/>
           </a:p>
@@ -2259,7 +2275,7 @@
           <a:p>
             <a:fld id="{665FFB82-DC97-4841-8F14-AC63817511EF}" type="datetimeFigureOut">
               <a:rPr lang="en-US" smtClean="0"/>
-              <a:t>7/29/2013</a:t>
+              <a:t>6/10/2014</a:t>
             </a:fld>
             <a:endParaRPr lang="en-US"/>
           </a:p>
@@ -2512,7 +2528,7 @@
           <a:p>
             <a:fld id="{665FFB82-DC97-4841-8F14-AC63817511EF}" type="datetimeFigureOut">
               <a:rPr lang="en-US" smtClean="0"/>
-              <a:t>7/29/2013</a:t>
+              <a:t>6/10/2014</a:t>
             </a:fld>
             <a:endParaRPr lang="en-US"/>
           </a:p>
@@ -2725,7 +2741,7 @@
           <a:p>
             <a:fld id="{665FFB82-DC97-4841-8F14-AC63817511EF}" type="datetimeFigureOut">
               <a:rPr lang="en-US" smtClean="0"/>
-              <a:t>7/29/2013</a:t>
+              <a:t>6/10/2014</a:t>
             </a:fld>
             <a:endParaRPr lang="en-US"/>
           </a:p>
@@ -3109,7 +3125,7 @@
         <p:spPr>
           <a:xfrm>
             <a:off x="457200" y="2895600"/>
-            <a:ext cx="8229600" cy="3693319"/>
+            <a:ext cx="8229600" cy="3970318"/>
           </a:xfrm>
           <a:prstGeom prst="rect">
             <a:avLst/>
@@ -3132,11 +3148,7 @@
             </a:r>
             <a:r>
               <a:rPr lang="en-US" dirty="0" smtClean="0"/>
-              <a:t>coordinate system (that </a:t>
-            </a:r>
-            <a:r>
-              <a:rPr lang="en-US" dirty="0" smtClean="0"/>
-              <a:t>has the origin in one of the image corner) to the </a:t>
+              <a:t>coordinate system (that has the origin in one of the image corner) to the </a:t>
             </a:r>
             <a:r>
               <a:rPr lang="en-US" i="1" dirty="0" smtClean="0"/>
@@ -3144,19 +3156,23 @@
             </a:r>
             <a:r>
               <a:rPr lang="en-US" dirty="0" smtClean="0"/>
-              <a:t>coordinate system</a:t>
+              <a:t>coordinate system. However, some users are interested in knowing positions in the </a:t>
+            </a:r>
+            <a:r>
+              <a:rPr lang="en-US" i="1" dirty="0" smtClean="0"/>
+              <a:t>Transducer </a:t>
             </a:r>
             <a:r>
               <a:rPr lang="en-US" dirty="0" smtClean="0"/>
-              <a:t>. However, some users are interested in knowing positions in the </a:t>
-            </a:r>
-            <a:r>
-              <a:rPr lang="en-US" i="1" dirty="0" smtClean="0"/>
-              <a:t>Ultrasound </a:t>
+              <a:t>coordinate system, which has </a:t>
             </a:r>
             <a:r>
               <a:rPr lang="en-US" dirty="0" smtClean="0"/>
-              <a:t>coordinate system, which has the same orientation and spacing as the </a:t>
+              <a:t>similar orientation (axes are parallel but the order and direction may be different) as </a:t>
+            </a:r>
+            <a:r>
+              <a:rPr lang="en-US" dirty="0" smtClean="0"/>
+              <a:t>the </a:t>
             </a:r>
             <a:r>
               <a:rPr lang="en-US" i="1" dirty="0" smtClean="0"/>
@@ -3164,8 +3180,13 @@
             </a:r>
             <a:r>
               <a:rPr lang="en-US" dirty="0" smtClean="0"/>
-              <a:t>coordinate system, but has the origin in the middle of the transducer pixel.</a:t>
-            </a:r>
+              <a:t>coordinate system, but has the origin in the middle of the transducer </a:t>
+            </a:r>
+            <a:r>
+              <a:rPr lang="en-US" dirty="0" smtClean="0"/>
+              <a:t>pixel and the unit is mm.</a:t>
+            </a:r>
+            <a:endParaRPr lang="en-US" dirty="0" smtClean="0"/>
           </a:p>
           <a:p>
             <a:endParaRPr lang="en-US" dirty="0" smtClean="0"/>
@@ -3185,19 +3206,27 @@
             </a:r>
             <a:r>
               <a:rPr lang="en-US" i="1" dirty="0" smtClean="0"/>
-              <a:t>Ultrasound</a:t>
+              <a:t>Transducer</a:t>
             </a:r>
             <a:r>
               <a:rPr lang="en-US" dirty="0" smtClean="0"/>
-              <a:t> coordinate system, which can be used to obtain the </a:t>
+              <a:t> </a:t>
+            </a:r>
+            <a:r>
+              <a:rPr lang="en-US" dirty="0" smtClean="0"/>
+              <a:t>coordinate system, which can be used to obtain the </a:t>
             </a:r>
             <a:r>
               <a:rPr lang="en-US" i="1" dirty="0" smtClean="0"/>
-              <a:t>Ultrasound</a:t>
+              <a:t>Transducer</a:t>
             </a:r>
             <a:r>
               <a:rPr lang="en-US" dirty="0" smtClean="0"/>
-              <a:t> to </a:t>
+              <a:t> </a:t>
+            </a:r>
+            <a:r>
+              <a:rPr lang="en-US" dirty="0" smtClean="0"/>
+              <a:t>to </a:t>
             </a:r>
             <a:r>
               <a:rPr lang="en-US" i="1" dirty="0" smtClean="0"/>
@@ -3226,15 +3255,19 @@
             </a:r>
             <a:r>
               <a:rPr lang="en-US" i="1" dirty="0" smtClean="0"/>
-              <a:t>Ultrasound</a:t>
+              <a:t>Transducer</a:t>
             </a:r>
             <a:r>
               <a:rPr lang="en-US" dirty="0" smtClean="0"/>
-              <a:t> coordinate system. To perform volume reconstruction using Plus, the </a:t>
+              <a:t> </a:t>
+            </a:r>
+            <a:r>
+              <a:rPr lang="en-US" dirty="0" smtClean="0"/>
+              <a:t>coordinate system. To perform volume reconstruction using Plus, the </a:t>
             </a:r>
             <a:r>
               <a:rPr lang="en-US" i="1" dirty="0" err="1" smtClean="0"/>
-              <a:t>UltrasoundToImage</a:t>
+              <a:t>TransducerToImage</a:t>
             </a:r>
             <a:r>
               <a:rPr lang="en-US" i="1" dirty="0" smtClean="0"/>
@@ -3286,7 +3319,19 @@
           <a:p>
             <a:r>
               <a:rPr lang="en-CA" dirty="0" smtClean="0"/>
-              <a:t>Compute transform between transducer center and the </a:t>
+              <a:t>Compute transform between </a:t>
+            </a:r>
+            <a:r>
+              <a:rPr lang="en-CA" i="1" dirty="0" smtClean="0"/>
+              <a:t>Transducer</a:t>
+            </a:r>
+            <a:r>
+              <a:rPr lang="en-CA" dirty="0" smtClean="0"/>
+              <a:t> </a:t>
+            </a:r>
+            <a:r>
+              <a:rPr lang="en-CA" dirty="0" smtClean="0"/>
+              <a:t>and </a:t>
             </a:r>
             <a:r>
               <a:rPr lang="en-CA" i="1" dirty="0" smtClean="0"/>
@@ -3296,7 +3341,6 @@
               <a:rPr lang="en-CA" dirty="0" smtClean="0"/>
               <a:t>coordinate system</a:t>
             </a:r>
-            <a:endParaRPr lang="en-CA" dirty="0" smtClean="0"/>
           </a:p>
         </p:txBody>
       </p:sp>
@@ -3392,10 +3436,10 @@
         </p:nvGrpSpPr>
         <p:grpSpPr>
           <a:xfrm>
-            <a:off x="3935150" y="697002"/>
-            <a:ext cx="1138149" cy="1357346"/>
-            <a:chOff x="5482720" y="62064"/>
-            <a:chExt cx="1138149" cy="1673348"/>
+            <a:off x="4005170" y="697002"/>
+            <a:ext cx="1068129" cy="1357346"/>
+            <a:chOff x="5552740" y="62064"/>
+            <a:chExt cx="1068129" cy="1673348"/>
           </a:xfrm>
         </p:grpSpPr>
         <p:sp>
@@ -3541,7 +3585,7 @@
           </p:nvSpPr>
           <p:spPr>
             <a:xfrm>
-              <a:off x="5482720" y="1301517"/>
+              <a:off x="6340681" y="464106"/>
               <a:ext cx="136119" cy="169143"/>
             </a:xfrm>
             <a:prstGeom prst="ellipse">
@@ -3620,263 +3664,6 @@
           </a:p>
         </p:txBody>
       </p:sp>
-      <p:grpSp>
-        <p:nvGrpSpPr>
-          <p:cNvPr id="68" name="Group 67"/>
-          <p:cNvGrpSpPr/>
-          <p:nvPr/>
-        </p:nvGrpSpPr>
-        <p:grpSpPr>
-          <a:xfrm>
-            <a:off x="4082807" y="3657600"/>
-            <a:ext cx="1497461" cy="1585345"/>
-            <a:chOff x="5935447" y="4923772"/>
-            <a:chExt cx="1497461" cy="1585345"/>
-          </a:xfrm>
-        </p:grpSpPr>
-        <p:cxnSp>
-          <p:nvCxnSpPr>
-            <p:cNvPr id="69" name="Straight Arrow Connector 68"/>
-            <p:cNvCxnSpPr/>
-            <p:nvPr/>
-          </p:nvCxnSpPr>
-          <p:spPr>
-            <a:xfrm>
-              <a:off x="6532512" y="5606385"/>
-              <a:ext cx="647700" cy="0"/>
-            </a:xfrm>
-            <a:prstGeom prst="straightConnector1">
-              <a:avLst/>
-            </a:prstGeom>
-            <a:ln>
-              <a:tailEnd type="arrow"/>
-            </a:ln>
-          </p:spPr>
-          <p:style>
-            <a:lnRef idx="2">
-              <a:schemeClr val="accent3"/>
-            </a:lnRef>
-            <a:fillRef idx="0">
-              <a:schemeClr val="accent3"/>
-            </a:fillRef>
-            <a:effectRef idx="1">
-              <a:schemeClr val="accent3"/>
-            </a:effectRef>
-            <a:fontRef idx="minor">
-              <a:schemeClr val="tx1"/>
-            </a:fontRef>
-          </p:style>
-        </p:cxnSp>
-        <p:sp>
-          <p:nvSpPr>
-            <p:cNvPr id="70" name="TextBox 69"/>
-            <p:cNvSpPr txBox="1"/>
-            <p:nvPr/>
-          </p:nvSpPr>
-          <p:spPr>
-            <a:xfrm>
-              <a:off x="7035781" y="5606385"/>
-              <a:ext cx="288862" cy="369332"/>
-            </a:xfrm>
-            <a:prstGeom prst="rect">
-              <a:avLst/>
-            </a:prstGeom>
-            <a:noFill/>
-          </p:spPr>
-          <p:txBody>
-            <a:bodyPr wrap="none" rtlCol="0">
-              <a:spAutoFit/>
-            </a:bodyPr>
-            <a:lstStyle/>
-            <a:p>
-              <a:r>
-                <a:rPr lang="en-US" dirty="0" smtClean="0"/>
-                <a:t>y</a:t>
-              </a:r>
-              <a:endParaRPr lang="en-US" dirty="0"/>
-            </a:p>
-          </p:txBody>
-        </p:sp>
-        <p:cxnSp>
-          <p:nvCxnSpPr>
-            <p:cNvPr id="71" name="Straight Arrow Connector 70"/>
-            <p:cNvCxnSpPr/>
-            <p:nvPr/>
-          </p:nvCxnSpPr>
-          <p:spPr>
-            <a:xfrm flipV="1">
-              <a:off x="6532512" y="5225385"/>
-              <a:ext cx="503269" cy="381000"/>
-            </a:xfrm>
-            <a:prstGeom prst="straightConnector1">
-              <a:avLst/>
-            </a:prstGeom>
-            <a:ln>
-              <a:tailEnd type="arrow"/>
-            </a:ln>
-          </p:spPr>
-          <p:style>
-            <a:lnRef idx="2">
-              <a:schemeClr val="accent3"/>
-            </a:lnRef>
-            <a:fillRef idx="0">
-              <a:schemeClr val="accent3"/>
-            </a:fillRef>
-            <a:effectRef idx="1">
-              <a:schemeClr val="accent3"/>
-            </a:effectRef>
-            <a:fontRef idx="minor">
-              <a:schemeClr val="tx1"/>
-            </a:fontRef>
-          </p:style>
-        </p:cxnSp>
-        <p:sp>
-          <p:nvSpPr>
-            <p:cNvPr id="72" name="TextBox 71"/>
-            <p:cNvSpPr txBox="1"/>
-            <p:nvPr/>
-          </p:nvSpPr>
-          <p:spPr>
-            <a:xfrm>
-              <a:off x="5935447" y="4923772"/>
-              <a:ext cx="1497461" cy="553998"/>
-            </a:xfrm>
-            <a:prstGeom prst="rect">
-              <a:avLst/>
-            </a:prstGeom>
-            <a:noFill/>
-          </p:spPr>
-          <p:txBody>
-            <a:bodyPr wrap="none" rtlCol="0">
-              <a:spAutoFit/>
-            </a:bodyPr>
-            <a:lstStyle/>
-            <a:p>
-              <a:r>
-                <a:rPr lang="en-US" dirty="0" err="1" smtClean="0">
-                  <a:solidFill>
-                    <a:srgbClr val="92D050"/>
-                  </a:solidFill>
-                </a:rPr>
-                <a:t>ReferenceStar</a:t>
-              </a:r>
-              <a:endParaRPr lang="en-US" dirty="0" smtClean="0">
-                <a:solidFill>
-                  <a:srgbClr val="92D050"/>
-                </a:solidFill>
-              </a:endParaRPr>
-            </a:p>
-            <a:p>
-              <a:r>
-                <a:rPr lang="en-US" sz="1200" dirty="0" smtClean="0">
-                  <a:solidFill>
-                    <a:srgbClr val="92D050"/>
-                  </a:solidFill>
-                </a:rPr>
-                <a:t>(unit: mm)</a:t>
-              </a:r>
-              <a:endParaRPr lang="en-US" sz="1200" dirty="0">
-                <a:solidFill>
-                  <a:srgbClr val="92D050"/>
-                </a:solidFill>
-              </a:endParaRPr>
-            </a:p>
-          </p:txBody>
-        </p:sp>
-        <p:cxnSp>
-          <p:nvCxnSpPr>
-            <p:cNvPr id="73" name="Straight Arrow Connector 72"/>
-            <p:cNvCxnSpPr/>
-            <p:nvPr/>
-          </p:nvCxnSpPr>
-          <p:spPr>
-            <a:xfrm>
-              <a:off x="6515579" y="5606385"/>
-              <a:ext cx="0" cy="762000"/>
-            </a:xfrm>
-            <a:prstGeom prst="straightConnector1">
-              <a:avLst/>
-            </a:prstGeom>
-            <a:ln>
-              <a:tailEnd type="arrow"/>
-            </a:ln>
-          </p:spPr>
-          <p:style>
-            <a:lnRef idx="2">
-              <a:schemeClr val="accent3"/>
-            </a:lnRef>
-            <a:fillRef idx="0">
-              <a:schemeClr val="accent3"/>
-            </a:fillRef>
-            <a:effectRef idx="1">
-              <a:schemeClr val="accent3"/>
-            </a:effectRef>
-            <a:fontRef idx="minor">
-              <a:schemeClr val="tx1"/>
-            </a:fontRef>
-          </p:style>
-        </p:cxnSp>
-        <p:sp>
-          <p:nvSpPr>
-            <p:cNvPr id="74" name="TextBox 73"/>
-            <p:cNvSpPr txBox="1"/>
-            <p:nvPr/>
-          </p:nvSpPr>
-          <p:spPr>
-            <a:xfrm>
-              <a:off x="6532512" y="6139785"/>
-              <a:ext cx="284052" cy="369332"/>
-            </a:xfrm>
-            <a:prstGeom prst="rect">
-              <a:avLst/>
-            </a:prstGeom>
-            <a:noFill/>
-          </p:spPr>
-          <p:txBody>
-            <a:bodyPr wrap="none" rtlCol="0">
-              <a:spAutoFit/>
-            </a:bodyPr>
-            <a:lstStyle/>
-            <a:p>
-              <a:r>
-                <a:rPr lang="en-US" dirty="0" smtClean="0"/>
-                <a:t>z</a:t>
-              </a:r>
-              <a:endParaRPr lang="en-US" dirty="0"/>
-            </a:p>
-          </p:txBody>
-        </p:sp>
-        <p:sp>
-          <p:nvSpPr>
-            <p:cNvPr id="75" name="TextBox 74"/>
-            <p:cNvSpPr txBox="1"/>
-            <p:nvPr/>
-          </p:nvSpPr>
-          <p:spPr>
-            <a:xfrm>
-              <a:off x="6669174" y="4996785"/>
-              <a:ext cx="284052" cy="369332"/>
-            </a:xfrm>
-            <a:prstGeom prst="rect">
-              <a:avLst/>
-            </a:prstGeom>
-            <a:noFill/>
-          </p:spPr>
-          <p:txBody>
-            <a:bodyPr wrap="none" rtlCol="0">
-              <a:spAutoFit/>
-            </a:bodyPr>
-            <a:lstStyle/>
-            <a:p>
-              <a:r>
-                <a:rPr lang="en-US" dirty="0" smtClean="0"/>
-                <a:t>x</a:t>
-              </a:r>
-              <a:endParaRPr lang="en-US" dirty="0"/>
-            </a:p>
-          </p:txBody>
-        </p:sp>
-      </p:grpSp>
       <p:grpSp>
         <p:nvGrpSpPr>
           <p:cNvPr id="37" name="Group 36"/>
@@ -4147,10 +3934,10 @@
         </p:nvGrpSpPr>
         <p:grpSpPr>
           <a:xfrm>
-            <a:off x="3300123" y="1546860"/>
-            <a:ext cx="2033989" cy="1512332"/>
-            <a:chOff x="5290654" y="4996785"/>
-            <a:chExt cx="2033989" cy="1512332"/>
+            <a:off x="3158925" y="1813588"/>
+            <a:ext cx="2170377" cy="1245604"/>
+            <a:chOff x="5149456" y="5263513"/>
+            <a:chExt cx="2170377" cy="1245604"/>
           </a:xfrm>
         </p:grpSpPr>
         <p:cxnSp>
@@ -4195,7 +3982,7 @@
           <p:spPr>
             <a:xfrm>
               <a:off x="7035781" y="5606385"/>
-              <a:ext cx="288862" cy="369332"/>
+              <a:ext cx="284052" cy="369332"/>
             </a:xfrm>
             <a:prstGeom prst="rect">
               <a:avLst/>
@@ -4214,7 +4001,7 @@
                     <a:schemeClr val="bg1"/>
                   </a:solidFill>
                 </a:rPr>
-                <a:t>y</a:t>
+                <a:t>x</a:t>
               </a:r>
               <a:endParaRPr lang="en-US" dirty="0">
                 <a:solidFill>
@@ -4231,8 +4018,8 @@
             <p:nvPr/>
           </p:nvCxnSpPr>
           <p:spPr>
-            <a:xfrm flipV="1">
-              <a:off x="6532512" y="5225385"/>
+            <a:xfrm flipH="1">
+              <a:off x="6029243" y="5606385"/>
               <a:ext cx="503269" cy="381000"/>
             </a:xfrm>
             <a:prstGeom prst="straightConnector1">
@@ -4265,8 +4052,8 @@
           </p:nvSpPr>
           <p:spPr>
             <a:xfrm>
-              <a:off x="5290654" y="5550874"/>
-              <a:ext cx="1225079" cy="553998"/>
+              <a:off x="5149456" y="5263513"/>
+              <a:ext cx="1217193" cy="553998"/>
             </a:xfrm>
             <a:prstGeom prst="rect">
               <a:avLst/>
@@ -4286,8 +4073,13 @@
                     <a:srgbClr val="92D050"/>
                   </a:solidFill>
                 </a:rPr>
-                <a:t>Ultrasound</a:t>
+                <a:t>Transducer</a:t>
               </a:r>
+              <a:endParaRPr lang="en-US" dirty="0" smtClean="0">
+                <a:solidFill>
+                  <a:srgbClr val="92D050"/>
+                </a:solidFill>
+              </a:endParaRPr>
             </a:p>
             <a:p>
               <a:pPr algn="ctr"/>
@@ -4386,8 +4178,8 @@
           </p:nvSpPr>
           <p:spPr>
             <a:xfrm>
-              <a:off x="6669174" y="4996785"/>
-              <a:ext cx="284052" cy="369332"/>
+              <a:off x="5943686" y="5911952"/>
+              <a:ext cx="288862" cy="369332"/>
             </a:xfrm>
             <a:prstGeom prst="rect">
               <a:avLst/>
@@ -4406,7 +4198,7 @@
                     <a:schemeClr val="bg1"/>
                   </a:solidFill>
                 </a:rPr>
-                <a:t>x</a:t>
+                <a:t>y</a:t>
               </a:r>
               <a:endParaRPr lang="en-US" dirty="0">
                 <a:solidFill>
@@ -4425,10 +4217,10 @@
         </p:nvGrpSpPr>
         <p:grpSpPr>
           <a:xfrm>
-            <a:off x="1096202" y="512336"/>
-            <a:ext cx="1224469" cy="1418723"/>
-            <a:chOff x="7068764" y="3199212"/>
-            <a:chExt cx="1224469" cy="1418723"/>
+            <a:off x="685800" y="697002"/>
+            <a:ext cx="2844113" cy="1268958"/>
+            <a:chOff x="6658362" y="3383878"/>
+            <a:chExt cx="2844113" cy="1268958"/>
           </a:xfrm>
         </p:grpSpPr>
         <p:cxnSp>
@@ -4472,8 +4264,8 @@
           </p:nvSpPr>
           <p:spPr>
             <a:xfrm>
-              <a:off x="7764905" y="4248603"/>
-              <a:ext cx="288862" cy="369332"/>
+              <a:off x="6658362" y="4283504"/>
+              <a:ext cx="960840" cy="369332"/>
             </a:xfrm>
             <a:prstGeom prst="rect">
               <a:avLst/>
@@ -4488,7 +4280,7 @@
             <a:p>
               <a:r>
                 <a:rPr lang="en-US" dirty="0" smtClean="0"/>
-                <a:t>y</a:t>
+                <a:t>y (F=far)</a:t>
               </a:r>
               <a:endParaRPr lang="en-US" dirty="0"/>
             </a:p>
@@ -4599,7 +4391,7 @@
           <p:spPr>
             <a:xfrm>
               <a:off x="8002769" y="3763834"/>
-              <a:ext cx="290464" cy="369332"/>
+              <a:ext cx="1499706" cy="369332"/>
             </a:xfrm>
             <a:prstGeom prst="rect">
               <a:avLst/>
@@ -4613,13 +4405,10 @@
             <a:lstStyle/>
             <a:p>
               <a:r>
-                <a:rPr lang="en-US" b="1" dirty="0">
-                  <a:solidFill>
-                    <a:srgbClr val="FF0000"/>
-                  </a:solidFill>
-                </a:rPr>
-                <a:t>x</a:t>
+                <a:rPr lang="en-US" dirty="0" smtClean="0"/>
+                <a:t>x (M=marked)</a:t>
               </a:r>
+              <a:endParaRPr lang="en-US" dirty="0"/>
             </a:p>
           </p:txBody>
         </p:sp>
@@ -4631,7 +4420,7 @@
           </p:nvSpPr>
           <p:spPr>
             <a:xfrm>
-              <a:off x="7068764" y="3199212"/>
+              <a:off x="6804747" y="3667103"/>
               <a:ext cx="892360" cy="553998"/>
             </a:xfrm>
             <a:prstGeom prst="rect">
@@ -4997,7 +4786,6 @@
               <a:rPr lang="en-CA" dirty="0" smtClean="0"/>
               <a:t>1. Coordinate systems definition</a:t>
             </a:r>
-            <a:endParaRPr lang="en-CA" dirty="0" smtClean="0"/>
           </a:p>
         </p:txBody>
       </p:sp>
@@ -5113,19 +4901,7 @@
             </a:r>
             <a:r>
               <a:rPr lang="en-US" dirty="0" smtClean="0"/>
-              <a:t>: </a:t>
-            </a:r>
-            <a:r>
-              <a:rPr lang="en-US" dirty="0" smtClean="0"/>
-              <a:t> (</a:t>
-            </a:r>
-            <a:r>
-              <a:rPr lang="en-US" dirty="0" smtClean="0"/>
-              <a:t>30mm/285pixel, 20mm/190pixel) = (0.105, 0.105) mm/pixel = 0.105 </a:t>
-            </a:r>
-            <a:r>
-              <a:rPr lang="en-US" dirty="0" smtClean="0"/>
-              <a:t>mm/pixel.</a:t>
+              <a:t>:  (30mm/285pixel, 20mm/190pixel) = (0.105, 0.105) mm/pixel = 0.105 mm/pixel.</a:t>
             </a:r>
           </a:p>
         </p:txBody>
@@ -5211,8 +4987,8 @@
         </p:nvSpPr>
         <p:spPr>
           <a:xfrm>
-            <a:off x="2819399" y="688538"/>
-            <a:ext cx="3824572" cy="784830"/>
+            <a:off x="2832833" y="688538"/>
+            <a:ext cx="3797706" cy="369332"/>
           </a:xfrm>
           <a:prstGeom prst="rect">
             <a:avLst/>
@@ -5244,11 +5020,15 @@
             </a:r>
             <a:r>
               <a:rPr lang="en-US" b="1" dirty="0" err="1" smtClean="0"/>
-              <a:t>UltrasoundToImage</a:t>
+              <a:t>TransducerToImage</a:t>
             </a:r>
             <a:r>
               <a:rPr lang="en-US" b="1" dirty="0" smtClean="0"/>
-              <a:t> * </a:t>
+              <a:t> </a:t>
+            </a:r>
+            <a:r>
+              <a:rPr lang="en-US" b="1" dirty="0" smtClean="0"/>
+              <a:t>* </a:t>
             </a:r>
             <a:r>
               <a:rPr lang="en-US" b="1" dirty="0" err="1" smtClean="0"/>
@@ -5256,28 +5036,9 @@
             </a:r>
             <a:r>
               <a:rPr lang="en-US" b="1" baseline="-25000" dirty="0" err="1" smtClean="0"/>
-              <a:t>Ultrasound</a:t>
+              <a:t>Transducer</a:t>
             </a:r>
             <a:endParaRPr lang="en-US" b="1" baseline="-25000" dirty="0" smtClean="0"/>
-          </a:p>
-          <a:p>
-            <a:pPr algn="ctr">
-              <a:lnSpc>
-                <a:spcPct val="150000"/>
-              </a:lnSpc>
-            </a:pPr>
-            <a:r>
-              <a:rPr lang="en-US" b="1" dirty="0" smtClean="0"/>
-              <a:t>=&gt; </a:t>
-            </a:r>
-            <a:r>
-              <a:rPr lang="en-US" b="1" dirty="0" err="1" smtClean="0"/>
-              <a:t>UltrasoundToImage</a:t>
-            </a:r>
-            <a:r>
-              <a:rPr lang="en-US" b="1" dirty="0" smtClean="0"/>
-              <a:t>=???</a:t>
-            </a:r>
           </a:p>
         </p:txBody>
       </p:sp>
@@ -5290,13 +5051,13 @@
           <p:nvPr>
             <p:extLst>
               <p:ext uri="{D42A27DB-BD31-4B8C-83A1-F6EECF244321}">
-                <p14:modId xmlns:p14="http://schemas.microsoft.com/office/powerpoint/2010/main" val="405425899"/>
+                <p14:modId xmlns:p14="http://schemas.microsoft.com/office/powerpoint/2010/main" val="2531639204"/>
               </p:ext>
             </p:extLst>
           </p:nvPr>
         </p:nvGraphicFramePr>
         <p:xfrm>
-          <a:off x="1185221" y="2711320"/>
+          <a:off x="1261421" y="2939920"/>
           <a:ext cx="2895600" cy="1921640"/>
         </p:xfrm>
         <a:graphic>
@@ -5317,42 +5078,48 @@
                     <a:bodyPr/>
                     <a:lstStyle/>
                     <a:p>
-                      <a:r>
-                        <a:rPr lang="en-US" dirty="0" smtClean="0"/>
-                        <a:t>?</a:t>
-                      </a:r>
                       <a:endParaRPr lang="en-US" i="1" dirty="0"/>
                     </a:p>
                   </a:txBody>
-                  <a:tcPr/>
+                  <a:tcPr>
+                    <a:solidFill>
+                      <a:schemeClr val="bg1">
+                        <a:lumMod val="65000"/>
+                      </a:schemeClr>
+                    </a:solidFill>
+                  </a:tcPr>
                 </a:tc>
                 <a:tc>
                   <a:txBody>
                     <a:bodyPr/>
                     <a:lstStyle/>
                     <a:p>
-                      <a:r>
-                        <a:rPr lang="en-US" dirty="0" smtClean="0"/>
-                        <a:t>?</a:t>
-                      </a:r>
                       <a:endParaRPr lang="en-US" i="1" dirty="0"/>
                     </a:p>
                   </a:txBody>
-                  <a:tcPr/>
+                  <a:tcPr>
+                    <a:solidFill>
+                      <a:schemeClr val="bg1">
+                        <a:lumMod val="65000"/>
+                      </a:schemeClr>
+                    </a:solidFill>
+                  </a:tcPr>
                 </a:tc>
                 <a:tc>
                   <a:txBody>
                     <a:bodyPr/>
                     <a:lstStyle/>
                     <a:p>
-                      <a:r>
-                        <a:rPr lang="en-US" dirty="0" smtClean="0"/>
-                        <a:t>?</a:t>
-                      </a:r>
                       <a:endParaRPr lang="en-US" i="1" dirty="0"/>
                     </a:p>
                   </a:txBody>
-                  <a:tcPr/>
+                  <a:tcPr>
+                    <a:solidFill>
+                      <a:schemeClr val="bg1">
+                        <a:lumMod val="65000"/>
+                      </a:schemeClr>
+                    </a:solidFill>
+                  </a:tcPr>
                 </a:tc>
                 <a:tc>
                   <a:txBody>
@@ -5375,42 +5142,48 @@
                     <a:bodyPr/>
                     <a:lstStyle/>
                     <a:p>
-                      <a:r>
-                        <a:rPr lang="en-US" dirty="0" smtClean="0"/>
-                        <a:t>?</a:t>
-                      </a:r>
                       <a:endParaRPr lang="en-US" i="1" dirty="0"/>
                     </a:p>
                   </a:txBody>
-                  <a:tcPr/>
+                  <a:tcPr>
+                    <a:solidFill>
+                      <a:schemeClr val="bg1">
+                        <a:lumMod val="65000"/>
+                      </a:schemeClr>
+                    </a:solidFill>
+                  </a:tcPr>
                 </a:tc>
                 <a:tc>
                   <a:txBody>
                     <a:bodyPr/>
                     <a:lstStyle/>
                     <a:p>
-                      <a:r>
-                        <a:rPr lang="en-US" dirty="0" smtClean="0"/>
-                        <a:t>?</a:t>
-                      </a:r>
                       <a:endParaRPr lang="en-US" i="1" dirty="0"/>
                     </a:p>
                   </a:txBody>
-                  <a:tcPr/>
+                  <a:tcPr>
+                    <a:solidFill>
+                      <a:schemeClr val="bg1">
+                        <a:lumMod val="65000"/>
+                      </a:schemeClr>
+                    </a:solidFill>
+                  </a:tcPr>
                 </a:tc>
                 <a:tc>
                   <a:txBody>
                     <a:bodyPr/>
                     <a:lstStyle/>
                     <a:p>
-                      <a:r>
-                        <a:rPr lang="en-US" dirty="0" smtClean="0"/>
-                        <a:t>?</a:t>
-                      </a:r>
                       <a:endParaRPr lang="en-US" i="1" dirty="0"/>
                     </a:p>
                   </a:txBody>
-                  <a:tcPr/>
+                  <a:tcPr>
+                    <a:solidFill>
+                      <a:schemeClr val="bg1">
+                        <a:lumMod val="65000"/>
+                      </a:schemeClr>
+                    </a:solidFill>
+                  </a:tcPr>
                 </a:tc>
                 <a:tc>
                   <a:txBody>
@@ -5433,42 +5206,48 @@
                     <a:bodyPr/>
                     <a:lstStyle/>
                     <a:p>
-                      <a:r>
-                        <a:rPr lang="en-US" dirty="0" smtClean="0"/>
-                        <a:t>?</a:t>
-                      </a:r>
                       <a:endParaRPr lang="en-US" i="1" dirty="0"/>
                     </a:p>
                   </a:txBody>
-                  <a:tcPr/>
+                  <a:tcPr>
+                    <a:solidFill>
+                      <a:schemeClr val="bg1">
+                        <a:lumMod val="65000"/>
+                      </a:schemeClr>
+                    </a:solidFill>
+                  </a:tcPr>
                 </a:tc>
                 <a:tc>
                   <a:txBody>
                     <a:bodyPr/>
                     <a:lstStyle/>
                     <a:p>
-                      <a:r>
-                        <a:rPr lang="en-US" dirty="0" smtClean="0"/>
-                        <a:t>?</a:t>
-                      </a:r>
                       <a:endParaRPr lang="en-US" i="1" dirty="0"/>
                     </a:p>
                   </a:txBody>
-                  <a:tcPr/>
+                  <a:tcPr>
+                    <a:solidFill>
+                      <a:schemeClr val="bg1">
+                        <a:lumMod val="65000"/>
+                      </a:schemeClr>
+                    </a:solidFill>
+                  </a:tcPr>
                 </a:tc>
                 <a:tc>
                   <a:txBody>
                     <a:bodyPr/>
                     <a:lstStyle/>
                     <a:p>
-                      <a:r>
-                        <a:rPr lang="en-US" dirty="0" smtClean="0"/>
-                        <a:t>?</a:t>
-                      </a:r>
                       <a:endParaRPr lang="en-US" i="1" dirty="0"/>
                     </a:p>
                   </a:txBody>
-                  <a:tcPr/>
+                  <a:tcPr>
+                    <a:solidFill>
+                      <a:schemeClr val="bg1">
+                        <a:lumMod val="65000"/>
+                      </a:schemeClr>
+                    </a:solidFill>
+                  </a:tcPr>
                 </a:tc>
                 <a:tc>
                   <a:txBody>
@@ -5555,8 +5334,8 @@
         </p:nvSpPr>
         <p:spPr>
           <a:xfrm>
-            <a:off x="186379" y="1439883"/>
-            <a:ext cx="3623621" cy="1477328"/>
+            <a:off x="186379" y="1194643"/>
+            <a:ext cx="4813818" cy="1754326"/>
           </a:xfrm>
           <a:prstGeom prst="rect">
             <a:avLst/>
@@ -5570,9 +5349,14 @@
           <a:lstStyle/>
           <a:p>
             <a:r>
-              <a:rPr lang="en-US" dirty="0" smtClean="0"/>
-              <a:t>1. Translation:</a:t>
-            </a:r>
+              <a:rPr lang="en-US" b="1" dirty="0" smtClean="0"/>
+              <a:t>1. </a:t>
+            </a:r>
+            <a:r>
+              <a:rPr lang="en-US" b="1" dirty="0" smtClean="0"/>
+              <a:t>Translation</a:t>
+            </a:r>
+            <a:endParaRPr lang="en-US" b="1" dirty="0" smtClean="0"/>
           </a:p>
           <a:p>
             <a:r>
@@ -5589,6 +5373,11 @@
             </a:r>
           </a:p>
           <a:p>
+            <a:pPr defTabSz="398463"/>
+            <a:r>
+              <a:rPr lang="en-US" dirty="0" smtClean="0"/>
+              <a:t>	</a:t>
+            </a:r>
             <a:r>
               <a:rPr lang="en-US" dirty="0" err="1" smtClean="0"/>
               <a:t>TransducerOrigin</a:t>
@@ -5603,17 +5392,26 @@
             </a:r>
             <a:r>
               <a:rPr lang="en-US" dirty="0" smtClean="0"/>
-              <a:t>= (934,194,0,1)</a:t>
-            </a:r>
-          </a:p>
-          <a:p>
+              <a:t>= (</a:t>
+            </a:r>
+            <a:r>
+              <a:rPr lang="en-US" dirty="0" smtClean="0"/>
+              <a:t>934,194,0,1)</a:t>
+            </a:r>
+          </a:p>
+          <a:p>
+            <a:pPr defTabSz="398463"/>
+            <a:r>
+              <a:rPr lang="en-US" dirty="0"/>
+              <a:t>	</a:t>
+            </a:r>
             <a:r>
               <a:rPr lang="en-US" dirty="0" err="1" smtClean="0"/>
               <a:t>TransducerOrigin</a:t>
             </a:r>
             <a:r>
               <a:rPr lang="en-US" baseline="-25000" dirty="0" err="1" smtClean="0"/>
-              <a:t>Ultrasound</a:t>
+              <a:t>Transducer</a:t>
             </a:r>
             <a:r>
               <a:rPr lang="en-US" baseline="-25000" dirty="0" smtClean="0"/>
@@ -5628,11 +5426,35 @@
               <a:t>(0,0,0,1</a:t>
             </a:r>
             <a:r>
-              <a:rPr lang="en-US" dirty="0"/>
+              <a:rPr lang="en-US" dirty="0" smtClean="0"/>
               <a:t>)</a:t>
             </a:r>
           </a:p>
           <a:p>
+            <a:pPr defTabSz="398463"/>
+            <a:r>
+              <a:rPr lang="en-US" dirty="0" smtClean="0"/>
+              <a:t>Therefore, the last column of the transform is the</a:t>
+            </a:r>
+            <a:br>
+              <a:rPr lang="en-US" dirty="0" smtClean="0"/>
+            </a:br>
+            <a:r>
+              <a:rPr lang="en-US" dirty="0" smtClean="0"/>
+              <a:t>same a</a:t>
+            </a:r>
+            <a:r>
+              <a:rPr lang="en-US" dirty="0" smtClean="0"/>
+              <a:t>s </a:t>
+            </a:r>
+            <a:r>
+              <a:rPr lang="en-US" dirty="0" err="1" smtClean="0"/>
+              <a:t>TransducerOrigin</a:t>
+            </a:r>
+            <a:r>
+              <a:rPr lang="en-US" baseline="-25000" dirty="0" err="1" smtClean="0"/>
+              <a:t>Image</a:t>
+            </a:r>
             <a:endParaRPr lang="en-US" dirty="0" smtClean="0"/>
           </a:p>
         </p:txBody>
@@ -5645,8 +5467,8 @@
         </p:nvSpPr>
         <p:spPr>
           <a:xfrm>
-            <a:off x="275434" y="4807803"/>
-            <a:ext cx="3790077" cy="830997"/>
+            <a:off x="5562600" y="1848302"/>
+            <a:ext cx="3296672" cy="1477328"/>
           </a:xfrm>
           <a:prstGeom prst="rect">
             <a:avLst/>
@@ -5660,26 +5482,64 @@
           <a:lstStyle/>
           <a:p>
             <a:r>
-              <a:rPr lang="en-US" dirty="0" smtClean="0"/>
-              <a:t>3. Axis directions:</a:t>
-            </a:r>
+              <a:rPr lang="en-US" b="1" dirty="0" smtClean="0"/>
+              <a:t>3. Axis </a:t>
+            </a:r>
+            <a:r>
+              <a:rPr lang="en-US" b="1" dirty="0" smtClean="0"/>
+              <a:t>directions</a:t>
+            </a:r>
+            <a:endParaRPr lang="en-US" b="1" dirty="0" smtClean="0"/>
           </a:p>
           <a:p>
             <a:r>
               <a:rPr lang="en-US" sz="1200" dirty="0" smtClean="0"/>
-              <a:t>Order of columns, optionally multiplying the column by -1</a:t>
-            </a:r>
-          </a:p>
-          <a:p>
-            <a:r>
-              <a:rPr lang="en-US" dirty="0"/>
-              <a:t>with trial and </a:t>
-            </a:r>
-            <a:r>
-              <a:rPr lang="en-US" dirty="0" smtClean="0"/>
-              <a:t>error</a:t>
-            </a:r>
-            <a:endParaRPr lang="en-US" dirty="0"/>
+              <a:t>Transducer x axis = Image x axis</a:t>
+            </a:r>
+            <a:br>
+              <a:rPr lang="en-US" sz="1200" dirty="0" smtClean="0"/>
+            </a:br>
+            <a:r>
+              <a:rPr lang="en-US" sz="1200" dirty="0" smtClean="0"/>
+              <a:t> =&gt; first column is [TransducerToImageScale,0,0</a:t>
+            </a:r>
+            <a:r>
+              <a:rPr lang="en-US" sz="1200" dirty="0"/>
+              <a:t>]</a:t>
+            </a:r>
+            <a:endParaRPr lang="en-US" sz="1200" dirty="0" smtClean="0"/>
+          </a:p>
+          <a:p>
+            <a:r>
+              <a:rPr lang="en-US" sz="1200" dirty="0" smtClean="0"/>
+              <a:t>Transducer y axis = Image -z axis</a:t>
+            </a:r>
+            <a:br>
+              <a:rPr lang="en-US" sz="1200" dirty="0" smtClean="0"/>
+            </a:br>
+            <a:r>
+              <a:rPr lang="en-US" sz="1200" dirty="0" smtClean="0"/>
+              <a:t> =&gt; second column [</a:t>
+            </a:r>
+            <a:r>
+              <a:rPr lang="en-US" sz="1200" dirty="0"/>
+              <a:t>0,0,-TransducerToImageScale]</a:t>
+            </a:r>
+            <a:endParaRPr lang="en-US" sz="1200" dirty="0" smtClean="0"/>
+          </a:p>
+          <a:p>
+            <a:r>
+              <a:rPr lang="en-US" sz="1200" dirty="0" smtClean="0"/>
+              <a:t>Transducer z axis = Image y axis</a:t>
+            </a:r>
+            <a:br>
+              <a:rPr lang="en-US" sz="1200" dirty="0" smtClean="0"/>
+            </a:br>
+            <a:r>
+              <a:rPr lang="en-US" sz="1200" dirty="0" smtClean="0"/>
+              <a:t> =&gt; third column is [0,TransducerToImageScale,0]</a:t>
+            </a:r>
+            <a:endParaRPr lang="en-US" sz="1200" dirty="0" smtClean="0"/>
           </a:p>
         </p:txBody>
       </p:sp>
@@ -5692,14 +5552,14 @@
           <p:nvPr>
             <p:extLst>
               <p:ext uri="{D42A27DB-BD31-4B8C-83A1-F6EECF244321}">
-                <p14:modId xmlns:p14="http://schemas.microsoft.com/office/powerpoint/2010/main" val="624907913"/>
+                <p14:modId xmlns:p14="http://schemas.microsoft.com/office/powerpoint/2010/main" val="4023210860"/>
               </p:ext>
             </p:extLst>
           </p:nvPr>
         </p:nvGraphicFramePr>
         <p:xfrm>
-          <a:off x="5994285" y="4648200"/>
-          <a:ext cx="2895600" cy="1921640"/>
+          <a:off x="6425966" y="5156478"/>
+          <a:ext cx="2403128" cy="1463040"/>
         </p:xfrm>
         <a:graphic>
           <a:graphicData uri="http://schemas.openxmlformats.org/drawingml/2006/table">
@@ -5708,12 +5568,12 @@
                 <a:tableStyleId>{5940675A-B579-460E-94D1-54222C63F5DA}</a:tableStyleId>
               </a:tblPr>
               <a:tblGrid>
-                <a:gridCol w="723900"/>
-                <a:gridCol w="723900"/>
-                <a:gridCol w="723900"/>
-                <a:gridCol w="723900"/>
+                <a:gridCol w="600782"/>
+                <a:gridCol w="600782"/>
+                <a:gridCol w="600782"/>
+                <a:gridCol w="600782"/>
               </a:tblGrid>
-              <a:tr h="480410">
+              <a:tr h="344080">
                 <a:tc>
                   <a:txBody>
                     <a:bodyPr/>
@@ -5771,7 +5631,7 @@
                   <a:tcPr/>
                 </a:tc>
               </a:tr>
-              <a:tr h="480410">
+              <a:tr h="344080">
                 <a:tc>
                   <a:txBody>
                     <a:bodyPr/>
@@ -5829,7 +5689,7 @@
                   <a:tcPr/>
                 </a:tc>
               </a:tr>
-              <a:tr h="480410">
+              <a:tr h="344080">
                 <a:tc>
                   <a:txBody>
                     <a:bodyPr/>
@@ -5887,7 +5747,7 @@
                   <a:tcPr/>
                 </a:tc>
               </a:tr>
-              <a:tr h="480410">
+              <a:tr h="344080">
                 <a:tc>
                   <a:txBody>
                     <a:bodyPr/>
@@ -5958,13 +5818,13 @@
           <p:nvPr>
             <p:extLst>
               <p:ext uri="{D42A27DB-BD31-4B8C-83A1-F6EECF244321}">
-                <p14:modId xmlns:p14="http://schemas.microsoft.com/office/powerpoint/2010/main" val="914074234"/>
+                <p14:modId xmlns:p14="http://schemas.microsoft.com/office/powerpoint/2010/main" val="2053943328"/>
               </p:ext>
             </p:extLst>
           </p:nvPr>
         </p:nvGraphicFramePr>
         <p:xfrm>
-          <a:off x="4381500" y="2726560"/>
+          <a:off x="4457700" y="2955160"/>
           <a:ext cx="723900" cy="1921640"/>
         </p:xfrm>
         <a:graphic>
@@ -6052,7 +5912,7 @@
         </p:nvSpPr>
         <p:spPr>
           <a:xfrm>
-            <a:off x="4069321" y="3388073"/>
+            <a:off x="4145521" y="3616673"/>
             <a:ext cx="300082" cy="369332"/>
           </a:xfrm>
           <a:prstGeom prst="rect">
@@ -6081,7 +5941,7 @@
         </p:nvSpPr>
         <p:spPr>
           <a:xfrm>
-            <a:off x="914400" y="3410933"/>
+            <a:off x="990600" y="3639533"/>
             <a:ext cx="300082" cy="369332"/>
           </a:xfrm>
           <a:prstGeom prst="rect">
@@ -6111,13 +5971,13 @@
           <p:nvPr>
             <p:extLst>
               <p:ext uri="{D42A27DB-BD31-4B8C-83A1-F6EECF244321}">
-                <p14:modId xmlns:p14="http://schemas.microsoft.com/office/powerpoint/2010/main" val="784291599"/>
+                <p14:modId xmlns:p14="http://schemas.microsoft.com/office/powerpoint/2010/main" val="1067195660"/>
               </p:ext>
             </p:extLst>
           </p:nvPr>
         </p:nvGraphicFramePr>
         <p:xfrm>
-          <a:off x="171450" y="2726560"/>
+          <a:off x="247650" y="2955160"/>
           <a:ext cx="723900" cy="1921640"/>
         </p:xfrm>
         <a:graphic>
@@ -6205,8 +6065,8 @@
         </p:nvSpPr>
         <p:spPr>
           <a:xfrm>
-            <a:off x="5334000" y="1461792"/>
-            <a:ext cx="3625801" cy="1107996"/>
+            <a:off x="186379" y="5334000"/>
+            <a:ext cx="4033470" cy="1107996"/>
           </a:xfrm>
           <a:prstGeom prst="rect">
             <a:avLst/>
@@ -6214,15 +6074,20 @@
           <a:noFill/>
         </p:spPr>
         <p:txBody>
-          <a:bodyPr wrap="none" rtlCol="0">
+          <a:bodyPr wrap="square" rtlCol="0">
             <a:spAutoFit/>
           </a:bodyPr>
           <a:lstStyle/>
           <a:p>
             <a:r>
-              <a:rPr lang="en-US" dirty="0" smtClean="0"/>
-              <a:t>2. Scaling:</a:t>
-            </a:r>
+              <a:rPr lang="en-US" b="1" dirty="0" smtClean="0"/>
+              <a:t>2. </a:t>
+            </a:r>
+            <a:r>
+              <a:rPr lang="en-US" b="1" dirty="0" smtClean="0"/>
+              <a:t>Scaling</a:t>
+            </a:r>
+            <a:endParaRPr lang="en-US" b="1" dirty="0" smtClean="0"/>
           </a:p>
           <a:p>
             <a:r>
@@ -6231,11 +6096,23 @@
             </a:r>
             <a:r>
               <a:rPr lang="en-US" sz="1200" dirty="0" err="1" smtClean="0"/>
-              <a:t>UltrasoundToImage</a:t>
+              <a:t>TransducerToImageScale</a:t>
             </a:r>
             <a:r>
               <a:rPr lang="en-US" sz="1200" dirty="0" smtClean="0"/>
-              <a:t> * Ultrasound (mm)</a:t>
+              <a:t> </a:t>
+            </a:r>
+            <a:r>
+              <a:rPr lang="en-US" sz="1200" dirty="0" smtClean="0"/>
+              <a:t>* </a:t>
+            </a:r>
+            <a:r>
+              <a:rPr lang="en-US" sz="1200" dirty="0"/>
+              <a:t>Transducer </a:t>
+            </a:r>
+            <a:r>
+              <a:rPr lang="en-US" sz="1200" dirty="0" smtClean="0"/>
+              <a:t>(mm)</a:t>
             </a:r>
           </a:p>
           <a:p>
@@ -6248,295 +6125,41 @@
               <a:t>= </a:t>
             </a:r>
             <a:r>
-              <a:rPr lang="en-US" sz="1200" dirty="0" err="1" smtClean="0"/>
-              <a:t>UltrasoundToImage</a:t>
+              <a:rPr lang="en-US" sz="1200" dirty="0" err="1"/>
+              <a:t>TransducerToImageScale</a:t>
             </a:r>
             <a:r>
               <a:rPr lang="en-US" sz="1200" dirty="0" smtClean="0"/>
-              <a:t> * 0.105mm</a:t>
-            </a:r>
-          </a:p>
-          <a:p>
-            <a:r>
-              <a:rPr lang="en-US" sz="1200" dirty="0" err="1" smtClean="0"/>
-              <a:t>UltrasoundToImage</a:t>
+              <a:t> </a:t>
             </a:r>
             <a:r>
               <a:rPr lang="en-US" sz="1200" dirty="0" smtClean="0"/>
-              <a:t> = 1 pixel/0.105 mm = 9.5 pixel/mm</a:t>
-            </a:r>
-          </a:p>
-          <a:p>
-            <a:endParaRPr lang="en-US" sz="1200" dirty="0"/>
-          </a:p>
-        </p:txBody>
-      </p:sp>
-      <p:graphicFrame>
-        <p:nvGraphicFramePr>
-          <p:cNvPr id="66" name="Table 65"/>
-          <p:cNvGraphicFramePr>
-            <a:graphicFrameLocks noGrp="1"/>
-          </p:cNvGraphicFramePr>
-          <p:nvPr>
-            <p:extLst>
-              <p:ext uri="{D42A27DB-BD31-4B8C-83A1-F6EECF244321}">
-                <p14:modId xmlns:p14="http://schemas.microsoft.com/office/powerpoint/2010/main" val="48887133"/>
-              </p:ext>
-            </p:extLst>
-          </p:nvPr>
-        </p:nvGraphicFramePr>
-        <p:xfrm>
-          <a:off x="5791200" y="2447880"/>
-          <a:ext cx="2895600" cy="1926105"/>
-        </p:xfrm>
-        <a:graphic>
-          <a:graphicData uri="http://schemas.openxmlformats.org/drawingml/2006/table">
-            <a:tbl>
-              <a:tblPr firstRow="1" bandRow="1">
-                <a:tableStyleId>{5940675A-B579-460E-94D1-54222C63F5DA}</a:tableStyleId>
-              </a:tblPr>
-              <a:tblGrid>
-                <a:gridCol w="723900"/>
-                <a:gridCol w="723900"/>
-                <a:gridCol w="723900"/>
-                <a:gridCol w="723900"/>
-              </a:tblGrid>
-              <a:tr h="480410">
-                <a:tc>
-                  <a:txBody>
-                    <a:bodyPr/>
-                    <a:lstStyle/>
-                    <a:p>
-                      <a:r>
-                        <a:rPr lang="en-US" b="1" dirty="0" smtClean="0"/>
-                        <a:t>9.5</a:t>
-                      </a:r>
-                      <a:endParaRPr lang="en-US" b="1" dirty="0"/>
-                    </a:p>
-                  </a:txBody>
-                  <a:tcPr/>
-                </a:tc>
-                <a:tc>
-                  <a:txBody>
-                    <a:bodyPr/>
-                    <a:lstStyle/>
-                    <a:p>
-                      <a:r>
-                        <a:rPr lang="en-US" dirty="0" smtClean="0"/>
-                        <a:t>?</a:t>
-                      </a:r>
-                      <a:endParaRPr lang="en-US" b="0" dirty="0"/>
-                    </a:p>
-                  </a:txBody>
-                  <a:tcPr/>
-                </a:tc>
-                <a:tc>
-                  <a:txBody>
-                    <a:bodyPr/>
-                    <a:lstStyle/>
-                    <a:p>
-                      <a:r>
-                        <a:rPr lang="en-US" dirty="0" smtClean="0"/>
-                        <a:t>?</a:t>
-                      </a:r>
-                      <a:endParaRPr lang="en-US" b="0" dirty="0"/>
-                    </a:p>
-                  </a:txBody>
-                  <a:tcPr/>
-                </a:tc>
-                <a:tc>
-                  <a:txBody>
-                    <a:bodyPr/>
-                    <a:lstStyle/>
-                    <a:p>
-                      <a:r>
-                        <a:rPr lang="en-US" dirty="0" smtClean="0"/>
-                        <a:t>?</a:t>
-                      </a:r>
-                      <a:endParaRPr lang="en-US" b="0" dirty="0"/>
-                    </a:p>
-                  </a:txBody>
-                  <a:tcPr/>
-                </a:tc>
-              </a:tr>
-              <a:tr h="480410">
-                <a:tc>
-                  <a:txBody>
-                    <a:bodyPr/>
-                    <a:lstStyle/>
-                    <a:p>
-                      <a:r>
-                        <a:rPr lang="en-US" dirty="0" smtClean="0"/>
-                        <a:t>?</a:t>
-                      </a:r>
-                      <a:endParaRPr lang="en-US" b="0" dirty="0"/>
-                    </a:p>
-                  </a:txBody>
-                  <a:tcPr/>
-                </a:tc>
-                <a:tc>
-                  <a:txBody>
-                    <a:bodyPr/>
-                    <a:lstStyle/>
-                    <a:p>
-                      <a:r>
-                        <a:rPr lang="en-US" b="1" dirty="0" smtClean="0"/>
-                        <a:t>9.5</a:t>
-                      </a:r>
-                      <a:endParaRPr lang="en-US" b="1" dirty="0"/>
-                    </a:p>
-                  </a:txBody>
-                  <a:tcPr/>
-                </a:tc>
-                <a:tc>
-                  <a:txBody>
-                    <a:bodyPr/>
-                    <a:lstStyle/>
-                    <a:p>
-                      <a:r>
-                        <a:rPr lang="en-US" dirty="0" smtClean="0"/>
-                        <a:t>?</a:t>
-                      </a:r>
-                      <a:endParaRPr lang="en-US" b="0" dirty="0"/>
-                    </a:p>
-                  </a:txBody>
-                  <a:tcPr/>
-                </a:tc>
-                <a:tc>
-                  <a:txBody>
-                    <a:bodyPr/>
-                    <a:lstStyle/>
-                    <a:p>
-                      <a:r>
-                        <a:rPr lang="en-US" dirty="0" smtClean="0"/>
-                        <a:t>?</a:t>
-                      </a:r>
-                      <a:endParaRPr lang="en-US" b="0" dirty="0"/>
-                    </a:p>
-                  </a:txBody>
-                  <a:tcPr/>
-                </a:tc>
-              </a:tr>
-              <a:tr h="480410">
-                <a:tc>
-                  <a:txBody>
-                    <a:bodyPr/>
-                    <a:lstStyle/>
-                    <a:p>
-                      <a:r>
-                        <a:rPr lang="en-US" b="0" dirty="0" smtClean="0"/>
-                        <a:t>?</a:t>
-                      </a:r>
-                      <a:endParaRPr lang="en-US" b="0" dirty="0"/>
-                    </a:p>
-                  </a:txBody>
-                  <a:tcPr/>
-                </a:tc>
-                <a:tc>
-                  <a:txBody>
-                    <a:bodyPr/>
-                    <a:lstStyle/>
-                    <a:p>
-                      <a:r>
-                        <a:rPr lang="en-US" dirty="0" smtClean="0"/>
-                        <a:t>?</a:t>
-                      </a:r>
-                      <a:endParaRPr lang="en-US" b="0" dirty="0"/>
-                    </a:p>
-                  </a:txBody>
-                  <a:tcPr/>
-                </a:tc>
-                <a:tc>
-                  <a:txBody>
-                    <a:bodyPr/>
-                    <a:lstStyle/>
-                    <a:p>
-                      <a:r>
-                        <a:rPr lang="en-US" b="1" dirty="0" smtClean="0"/>
-                        <a:t>9.5</a:t>
-                      </a:r>
-                      <a:endParaRPr lang="en-US" b="1" dirty="0"/>
-                    </a:p>
-                  </a:txBody>
-                  <a:tcPr/>
-                </a:tc>
-                <a:tc>
-                  <a:txBody>
-                    <a:bodyPr/>
-                    <a:lstStyle/>
-                    <a:p>
-                      <a:r>
-                        <a:rPr lang="en-US" dirty="0" smtClean="0"/>
-                        <a:t>?</a:t>
-                      </a:r>
-                      <a:endParaRPr lang="en-US" b="0" dirty="0"/>
-                    </a:p>
-                  </a:txBody>
-                  <a:tcPr/>
-                </a:tc>
-              </a:tr>
-              <a:tr h="484875">
-                <a:tc>
-                  <a:txBody>
-                    <a:bodyPr/>
-                    <a:lstStyle/>
-                    <a:p>
-                      <a:r>
-                        <a:rPr lang="en-US" dirty="0" smtClean="0"/>
-                        <a:t>0</a:t>
-                      </a:r>
-                      <a:endParaRPr lang="en-US" b="0" dirty="0"/>
-                    </a:p>
-                  </a:txBody>
-                  <a:tcPr/>
-                </a:tc>
-                <a:tc>
-                  <a:txBody>
-                    <a:bodyPr/>
-                    <a:lstStyle/>
-                    <a:p>
-                      <a:r>
-                        <a:rPr lang="en-US" dirty="0" smtClean="0"/>
-                        <a:t>0</a:t>
-                      </a:r>
-                      <a:endParaRPr lang="en-US" b="0" dirty="0"/>
-                    </a:p>
-                  </a:txBody>
-                  <a:tcPr/>
-                </a:tc>
-                <a:tc>
-                  <a:txBody>
-                    <a:bodyPr/>
-                    <a:lstStyle/>
-                    <a:p>
-                      <a:r>
-                        <a:rPr lang="en-US" dirty="0" smtClean="0"/>
-                        <a:t>0</a:t>
-                      </a:r>
-                      <a:endParaRPr lang="en-US" b="0" dirty="0"/>
-                    </a:p>
-                  </a:txBody>
-                  <a:tcPr/>
-                </a:tc>
-                <a:tc>
-                  <a:txBody>
-                    <a:bodyPr/>
-                    <a:lstStyle/>
-                    <a:p>
-                      <a:r>
-                        <a:rPr lang="en-US" dirty="0" smtClean="0"/>
-                        <a:t>1</a:t>
-                      </a:r>
-                      <a:endParaRPr lang="en-US" b="0" dirty="0"/>
-                    </a:p>
-                  </a:txBody>
-                  <a:tcPr/>
-                </a:tc>
-              </a:tr>
-            </a:tbl>
-          </a:graphicData>
-        </a:graphic>
-      </p:graphicFrame>
+              <a:t>* 0.105mm</a:t>
+            </a:r>
+          </a:p>
+          <a:p>
+            <a:r>
+              <a:rPr lang="en-US" sz="1200" dirty="0" err="1"/>
+              <a:t>TransducerToImageScale</a:t>
+            </a:r>
+            <a:r>
+              <a:rPr lang="en-US" sz="1200" dirty="0" smtClean="0"/>
+              <a:t> </a:t>
+            </a:r>
+            <a:r>
+              <a:rPr lang="en-US" sz="1200" dirty="0" smtClean="0"/>
+              <a:t>= 1 pixel/0.105 mm = 9.5 </a:t>
+            </a:r>
+            <a:r>
+              <a:rPr lang="en-US" sz="1200" dirty="0" smtClean="0"/>
+              <a:t>pixel/mm</a:t>
+            </a:r>
+          </a:p>
+          <a:p>
+            <a:endParaRPr lang="en-US" sz="1200" dirty="0" smtClean="0"/>
+          </a:p>
+        </p:txBody>
+      </p:sp>
       <p:sp>
         <p:nvSpPr>
           <p:cNvPr id="67" name="TextBox 66"/>
@@ -6545,8 +6168,8 @@
         </p:nvSpPr>
         <p:spPr>
           <a:xfrm>
-            <a:off x="3582223" y="5486400"/>
-            <a:ext cx="2285177" cy="923330"/>
+            <a:off x="5486400" y="4419600"/>
+            <a:ext cx="2332883" cy="923330"/>
           </a:xfrm>
           <a:prstGeom prst="rect">
             <a:avLst/>
@@ -6567,12 +6190,20 @@
           </a:p>
           <a:p>
             <a:r>
+              <a:rPr lang="en-US" dirty="0" smtClean="0"/>
+              <a:t>  </a:t>
+            </a:r>
+            <a:r>
               <a:rPr lang="en-US" dirty="0" err="1" smtClean="0"/>
-              <a:t>UltrasoundToImage</a:t>
+              <a:t>TransducerToImage</a:t>
             </a:r>
             <a:r>
               <a:rPr lang="en-US" dirty="0" smtClean="0"/>
-              <a:t> = </a:t>
+              <a:t> </a:t>
+            </a:r>
+            <a:r>
+              <a:rPr lang="en-US" dirty="0" smtClean="0"/>
+              <a:t>= </a:t>
             </a:r>
           </a:p>
           <a:p>
@@ -6622,7 +6253,7 @@
             </a:r>
             <a:r>
               <a:rPr lang="en-CA" i="1" dirty="0" err="1" smtClean="0"/>
-              <a:t>UltrasoundToImage</a:t>
+              <a:t>TransducerToImage</a:t>
             </a:r>
             <a:endParaRPr lang="en-CA" i="1" dirty="0" smtClean="0"/>
           </a:p>
@@ -6775,7 +6406,21 @@
                 <a:latin typeface="Courier New" pitchFamily="49" charset="0"/>
                 <a:cs typeface="Courier New" pitchFamily="49" charset="0"/>
               </a:rPr>
-              <a:t>&lt;Transform From="Ultrasound" To="Image"</a:t>
+              <a:t>&lt;Transform From</a:t>
+            </a:r>
+            <a:r>
+              <a:rPr lang="en-CA" sz="1400" dirty="0" smtClean="0">
+                <a:latin typeface="Courier New" pitchFamily="49" charset="0"/>
+                <a:cs typeface="Courier New" pitchFamily="49" charset="0"/>
+              </a:rPr>
+              <a:t>="Transducer" </a:t>
+            </a:r>
+            <a:r>
+              <a:rPr lang="en-CA" sz="1400" dirty="0">
+                <a:latin typeface="Courier New" pitchFamily="49" charset="0"/>
+                <a:cs typeface="Courier New" pitchFamily="49" charset="0"/>
+              </a:rPr>
+              <a:t>To="Image"</a:t>
             </a:r>
           </a:p>
           <a:p>
@@ -6992,7 +6637,6 @@
               <a:rPr lang="en-CA" dirty="0"/>
               <a:t> matrix is known</a:t>
             </a:r>
-            <a:endParaRPr lang="en-CA" dirty="0"/>
           </a:p>
         </p:txBody>
       </p:sp>

</xml_diff>